<commit_message>
Update presentation for Roma
</commit_message>
<xml_diff>
--- a/2023/Диплом/Рома Павлов/Презентация Рома.pptx
+++ b/2023/Диплом/Рома Павлов/Презентация Рома.pptx
@@ -11,8 +11,8 @@
     <p:sldId id="259" r:id="rId5"/>
     <p:sldId id="260" r:id="rId6"/>
     <p:sldId id="263" r:id="rId7"/>
-    <p:sldId id="264" r:id="rId8"/>
-    <p:sldId id="265" r:id="rId9"/>
+    <p:sldId id="267" r:id="rId8"/>
+    <p:sldId id="268" r:id="rId9"/>
     <p:sldId id="266" r:id="rId10"/>
   </p:sldIdLst>
   <p:sldSz cx="12192000" cy="6858000"/>
@@ -842,7 +842,7 @@
           <a:p>
             <a:fld id="{8720104C-3C9D-4B62-9936-5C987D21D7C9}" type="datetimeFigureOut">
               <a:rPr lang="ru-RU" smtClean="0"/>
-              <a:t>13.05.2023</a:t>
+              <a:t>01.06.2023</a:t>
             </a:fld>
             <a:endParaRPr lang="ru-RU"/>
           </a:p>
@@ -1093,7 +1093,7 @@
           <a:p>
             <a:fld id="{8720104C-3C9D-4B62-9936-5C987D21D7C9}" type="datetimeFigureOut">
               <a:rPr lang="ru-RU" smtClean="0"/>
-              <a:t>13.05.2023</a:t>
+              <a:t>01.06.2023</a:t>
             </a:fld>
             <a:endParaRPr lang="ru-RU"/>
           </a:p>
@@ -1407,7 +1407,7 @@
           <a:p>
             <a:fld id="{8720104C-3C9D-4B62-9936-5C987D21D7C9}" type="datetimeFigureOut">
               <a:rPr lang="ru-RU" smtClean="0"/>
-              <a:t>13.05.2023</a:t>
+              <a:t>01.06.2023</a:t>
             </a:fld>
             <a:endParaRPr lang="ru-RU"/>
           </a:p>
@@ -1748,7 +1748,7 @@
           <a:p>
             <a:fld id="{8720104C-3C9D-4B62-9936-5C987D21D7C9}" type="datetimeFigureOut">
               <a:rPr lang="ru-RU" smtClean="0"/>
-              <a:t>13.05.2023</a:t>
+              <a:t>01.06.2023</a:t>
             </a:fld>
             <a:endParaRPr lang="ru-RU"/>
           </a:p>
@@ -2062,7 +2062,7 @@
           <a:p>
             <a:fld id="{8720104C-3C9D-4B62-9936-5C987D21D7C9}" type="datetimeFigureOut">
               <a:rPr lang="ru-RU" smtClean="0"/>
-              <a:t>13.05.2023</a:t>
+              <a:t>01.06.2023</a:t>
             </a:fld>
             <a:endParaRPr lang="ru-RU"/>
           </a:p>
@@ -2455,7 +2455,7 @@
           <a:p>
             <a:fld id="{8720104C-3C9D-4B62-9936-5C987D21D7C9}" type="datetimeFigureOut">
               <a:rPr lang="ru-RU" smtClean="0"/>
-              <a:t>13.05.2023</a:t>
+              <a:t>01.06.2023</a:t>
             </a:fld>
             <a:endParaRPr lang="ru-RU"/>
           </a:p>
@@ -2625,7 +2625,7 @@
           <a:p>
             <a:fld id="{8720104C-3C9D-4B62-9936-5C987D21D7C9}" type="datetimeFigureOut">
               <a:rPr lang="ru-RU" smtClean="0"/>
-              <a:t>13.05.2023</a:t>
+              <a:t>01.06.2023</a:t>
             </a:fld>
             <a:endParaRPr lang="ru-RU"/>
           </a:p>
@@ -2805,7 +2805,7 @@
           <a:p>
             <a:fld id="{8720104C-3C9D-4B62-9936-5C987D21D7C9}" type="datetimeFigureOut">
               <a:rPr lang="ru-RU" smtClean="0"/>
-              <a:t>13.05.2023</a:t>
+              <a:t>01.06.2023</a:t>
             </a:fld>
             <a:endParaRPr lang="ru-RU"/>
           </a:p>
@@ -2981,7 +2981,7 @@
           <a:p>
             <a:fld id="{8720104C-3C9D-4B62-9936-5C987D21D7C9}" type="datetimeFigureOut">
               <a:rPr lang="ru-RU" smtClean="0"/>
-              <a:t>13.05.2023</a:t>
+              <a:t>01.06.2023</a:t>
             </a:fld>
             <a:endParaRPr lang="ru-RU"/>
           </a:p>
@@ -3228,7 +3228,7 @@
           <a:p>
             <a:fld id="{8720104C-3C9D-4B62-9936-5C987D21D7C9}" type="datetimeFigureOut">
               <a:rPr lang="ru-RU" smtClean="0"/>
-              <a:t>13.05.2023</a:t>
+              <a:t>01.06.2023</a:t>
             </a:fld>
             <a:endParaRPr lang="ru-RU"/>
           </a:p>
@@ -3460,7 +3460,7 @@
           <a:p>
             <a:fld id="{8720104C-3C9D-4B62-9936-5C987D21D7C9}" type="datetimeFigureOut">
               <a:rPr lang="ru-RU" smtClean="0"/>
-              <a:t>13.05.2023</a:t>
+              <a:t>01.06.2023</a:t>
             </a:fld>
             <a:endParaRPr lang="ru-RU"/>
           </a:p>
@@ -3834,7 +3834,7 @@
           <a:p>
             <a:fld id="{8720104C-3C9D-4B62-9936-5C987D21D7C9}" type="datetimeFigureOut">
               <a:rPr lang="ru-RU" smtClean="0"/>
-              <a:t>13.05.2023</a:t>
+              <a:t>01.06.2023</a:t>
             </a:fld>
             <a:endParaRPr lang="ru-RU"/>
           </a:p>
@@ -3957,7 +3957,7 @@
           <a:p>
             <a:fld id="{8720104C-3C9D-4B62-9936-5C987D21D7C9}" type="datetimeFigureOut">
               <a:rPr lang="ru-RU" smtClean="0"/>
-              <a:t>13.05.2023</a:t>
+              <a:t>01.06.2023</a:t>
             </a:fld>
             <a:endParaRPr lang="ru-RU"/>
           </a:p>
@@ -4052,7 +4052,7 @@
           <a:p>
             <a:fld id="{8720104C-3C9D-4B62-9936-5C987D21D7C9}" type="datetimeFigureOut">
               <a:rPr lang="ru-RU" smtClean="0"/>
-              <a:t>13.05.2023</a:t>
+              <a:t>01.06.2023</a:t>
             </a:fld>
             <a:endParaRPr lang="ru-RU"/>
           </a:p>
@@ -4307,7 +4307,7 @@
           <a:p>
             <a:fld id="{8720104C-3C9D-4B62-9936-5C987D21D7C9}" type="datetimeFigureOut">
               <a:rPr lang="ru-RU" smtClean="0"/>
-              <a:t>13.05.2023</a:t>
+              <a:t>01.06.2023</a:t>
             </a:fld>
             <a:endParaRPr lang="ru-RU"/>
           </a:p>
@@ -4570,7 +4570,7 @@
           <a:p>
             <a:fld id="{8720104C-3C9D-4B62-9936-5C987D21D7C9}" type="datetimeFigureOut">
               <a:rPr lang="ru-RU" smtClean="0"/>
-              <a:t>13.05.2023</a:t>
+              <a:t>01.06.2023</a:t>
             </a:fld>
             <a:endParaRPr lang="ru-RU"/>
           </a:p>
@@ -5313,7 +5313,7 @@
           <a:p>
             <a:fld id="{8720104C-3C9D-4B62-9936-5C987D21D7C9}" type="datetimeFigureOut">
               <a:rPr lang="ru-RU" smtClean="0"/>
-              <a:t>13.05.2023</a:t>
+              <a:t>01.06.2023</a:t>
             </a:fld>
             <a:endParaRPr lang="ru-RU"/>
           </a:p>
@@ -6721,45 +6721,34 @@
         </p:nvSpPr>
         <p:spPr>
           <a:xfrm>
-            <a:off x="0" y="124691"/>
-            <a:ext cx="12192000" cy="845127"/>
+            <a:off x="677334" y="609600"/>
+            <a:ext cx="10558702" cy="1320800"/>
           </a:xfrm>
         </p:spPr>
         <p:txBody>
           <a:bodyPr>
-            <a:normAutofit/>
+            <a:noAutofit/>
           </a:bodyPr>
           <a:lstStyle/>
           <a:p>
             <a:r>
-              <a:rPr lang="ru-RU" dirty="0">
+              <a:rPr lang="ru-RU" sz="4400" dirty="0">
                 <a:solidFill>
                   <a:schemeClr val="tx1"/>
                 </a:solidFill>
                 <a:latin typeface="Times New Roman" panose="02020603050405020304" pitchFamily="18" charset="0"/>
                 <a:cs typeface="Times New Roman" panose="02020603050405020304" pitchFamily="18" charset="0"/>
               </a:rPr>
-              <a:t>БЕЗОПАСНОСТЬ И ЭКОЛОГИЧНОСТЬ </a:t>
-            </a:r>
-            <a:r>
-              <a:rPr lang="ru-RU" dirty="0" smtClean="0">
-                <a:solidFill>
-                  <a:schemeClr val="tx1"/>
-                </a:solidFill>
-                <a:latin typeface="Times New Roman" panose="02020603050405020304" pitchFamily="18" charset="0"/>
-                <a:cs typeface="Times New Roman" panose="02020603050405020304" pitchFamily="18" charset="0"/>
-              </a:rPr>
-              <a:t>ТЕХ.ПРОЦЕССА</a:t>
-            </a:r>
-            <a:endParaRPr lang="ru-RU" dirty="0"/>
+              <a:t>Датчик температуры SITRANS TF2</a:t>
+            </a:r>
           </a:p>
         </p:txBody>
       </p:sp>
       <p:pic>
         <p:nvPicPr>
-          <p:cNvPr id="1026" name="Picture 2" descr="Что такое экология – значение, определение и виды | SHARAUT: Что это такое?  | Дзен"/>
+          <p:cNvPr id="4" name="Объект 3" descr="7NG3140-....."/>
           <p:cNvPicPr>
-            <a:picLocks noGrp="1" noChangeAspect="1" noChangeArrowheads="1"/>
+            <a:picLocks noGrp="1"/>
           </p:cNvPicPr>
           <p:nvPr>
             <p:ph idx="1"/>
@@ -6780,28 +6769,22 @@
         </p:blipFill>
         <p:spPr bwMode="auto">
           <a:xfrm>
-            <a:off x="1160753" y="969818"/>
-            <a:ext cx="8759102" cy="5832102"/>
+            <a:off x="2923308" y="2272145"/>
+            <a:ext cx="5583383" cy="3962400"/>
           </a:xfrm>
           <a:prstGeom prst="rect">
             <a:avLst/>
           </a:prstGeom>
           <a:noFill/>
-          <a:extLst>
-            <a:ext uri="{909E8E84-426E-40DD-AFC4-6F175D3DCCD1}">
-              <a14:hiddenFill xmlns:a14="http://schemas.microsoft.com/office/drawing/2010/main">
-                <a:solidFill>
-                  <a:srgbClr val="FFFFFF"/>
-                </a:solidFill>
-              </a14:hiddenFill>
-            </a:ext>
-          </a:extLst>
+          <a:ln>
+            <a:noFill/>
+          </a:ln>
         </p:spPr>
       </p:pic>
     </p:spTree>
     <p:extLst>
       <p:ext uri="{BB962C8B-B14F-4D97-AF65-F5344CB8AC3E}">
-        <p14:creationId xmlns:p14="http://schemas.microsoft.com/office/powerpoint/2010/main" val="1021495229"/>
+        <p14:creationId xmlns:p14="http://schemas.microsoft.com/office/powerpoint/2010/main" val="489691606"/>
       </p:ext>
     </p:extLst>
   </p:cSld>
@@ -6840,26 +6823,37 @@
         </p:nvSpPr>
         <p:spPr>
           <a:xfrm>
-            <a:off x="124691" y="180110"/>
-            <a:ext cx="11014364" cy="817418"/>
+            <a:off x="1037552" y="526472"/>
+            <a:ext cx="8596668" cy="1320800"/>
           </a:xfrm>
         </p:spPr>
         <p:txBody>
-          <a:bodyPr/>
-          <a:lstStyle/>
-          <a:p>
-            <a:pPr marL="285750" indent="-285750"/>
-            <a:r>
-              <a:rPr lang="ru-RU" dirty="0" smtClean="0">
+          <a:bodyPr>
+            <a:noAutofit/>
+          </a:bodyPr>
+          <a:lstStyle/>
+          <a:p>
+            <a:r>
+              <a:rPr lang="ru-RU" sz="5400" dirty="0">
                 <a:solidFill>
                   <a:schemeClr val="tx1"/>
                 </a:solidFill>
                 <a:latin typeface="Times New Roman" panose="02020603050405020304" pitchFamily="18" charset="0"/>
                 <a:cs typeface="Times New Roman" panose="02020603050405020304" pitchFamily="18" charset="0"/>
               </a:rPr>
-              <a:t>ТЕХНИКО-ЭКОНОМИЧЕСКИЕ ПОКАЗАТЕЛИ</a:t>
-            </a:r>
-            <a:endParaRPr lang="ru-RU" dirty="0">
+              <a:t>ПЛК SIMATIC </a:t>
+            </a:r>
+            <a:r>
+              <a:rPr lang="ru-RU" sz="5400" dirty="0" smtClean="0">
+                <a:solidFill>
+                  <a:schemeClr val="tx1"/>
+                </a:solidFill>
+                <a:latin typeface="Times New Roman" panose="02020603050405020304" pitchFamily="18" charset="0"/>
+                <a:cs typeface="Times New Roman" panose="02020603050405020304" pitchFamily="18" charset="0"/>
+              </a:rPr>
+              <a:t>S7-400</a:t>
+            </a:r>
+            <a:endParaRPr lang="ru-RU" sz="5400" dirty="0">
               <a:solidFill>
                 <a:schemeClr val="tx1"/>
               </a:solidFill>
@@ -6871,9 +6865,9 @@
       </p:sp>
       <p:pic>
         <p:nvPicPr>
-          <p:cNvPr id="3074" name="Picture 2" descr="Основные экономические показатели для инвестора - СберБанк |  Инвестиции.Доходчиво"/>
+          <p:cNvPr id="4" name="Объект 3" descr="Микроконтроллеры Simatic серии S7-400"/>
           <p:cNvPicPr>
-            <a:picLocks noGrp="1" noChangeAspect="1" noChangeArrowheads="1"/>
+            <a:picLocks noGrp="1"/>
           </p:cNvPicPr>
           <p:nvPr>
             <p:ph idx="1"/>
@@ -6894,28 +6888,22 @@
         </p:blipFill>
         <p:spPr bwMode="auto">
           <a:xfrm>
-            <a:off x="901052" y="1107643"/>
-            <a:ext cx="8852549" cy="5532843"/>
+            <a:off x="1778906" y="2185914"/>
+            <a:ext cx="6587488" cy="3979359"/>
           </a:xfrm>
           <a:prstGeom prst="rect">
             <a:avLst/>
           </a:prstGeom>
           <a:noFill/>
-          <a:extLst>
-            <a:ext uri="{909E8E84-426E-40DD-AFC4-6F175D3DCCD1}">
-              <a14:hiddenFill xmlns:a14="http://schemas.microsoft.com/office/drawing/2010/main">
-                <a:solidFill>
-                  <a:srgbClr val="FFFFFF"/>
-                </a:solidFill>
-              </a14:hiddenFill>
-            </a:ext>
-          </a:extLst>
+          <a:ln>
+            <a:noFill/>
+          </a:ln>
         </p:spPr>
       </p:pic>
     </p:spTree>
     <p:extLst>
       <p:ext uri="{BB962C8B-B14F-4D97-AF65-F5344CB8AC3E}">
-        <p14:creationId xmlns:p14="http://schemas.microsoft.com/office/powerpoint/2010/main" val="907799190"/>
+        <p14:creationId xmlns:p14="http://schemas.microsoft.com/office/powerpoint/2010/main" val="494503469"/>
       </p:ext>
     </p:extLst>
   </p:cSld>

</xml_diff>